<commit_message>
cambio de SEO en ppt de Angular
</commit_message>
<xml_diff>
--- a/Step 10 - Angular/Presentación12.pptx
+++ b/Step 10 - Angular/Presentación12.pptx
@@ -267,7 +267,7 @@
           <a:p>
             <a:fld id="{92835CAA-DB26-41EB-9DA5-3B4C0531874A}" type="datetimeFigureOut">
               <a:rPr lang="es-ES" smtClean="0"/>
-              <a:t>04/08/2019</a:t>
+              <a:t>21/09/2019</a:t>
             </a:fld>
             <a:endParaRPr lang="es-ES"/>
           </a:p>
@@ -465,7 +465,7 @@
           <a:p>
             <a:fld id="{92835CAA-DB26-41EB-9DA5-3B4C0531874A}" type="datetimeFigureOut">
               <a:rPr lang="es-ES" smtClean="0"/>
-              <a:t>04/08/2019</a:t>
+              <a:t>21/09/2019</a:t>
             </a:fld>
             <a:endParaRPr lang="es-ES"/>
           </a:p>
@@ -673,7 +673,7 @@
           <a:p>
             <a:fld id="{92835CAA-DB26-41EB-9DA5-3B4C0531874A}" type="datetimeFigureOut">
               <a:rPr lang="es-ES" smtClean="0"/>
-              <a:t>04/08/2019</a:t>
+              <a:t>21/09/2019</a:t>
             </a:fld>
             <a:endParaRPr lang="es-ES"/>
           </a:p>
@@ -871,7 +871,7 @@
           <a:p>
             <a:fld id="{92835CAA-DB26-41EB-9DA5-3B4C0531874A}" type="datetimeFigureOut">
               <a:rPr lang="es-ES" smtClean="0"/>
-              <a:t>04/08/2019</a:t>
+              <a:t>21/09/2019</a:t>
             </a:fld>
             <a:endParaRPr lang="es-ES"/>
           </a:p>
@@ -1146,7 +1146,7 @@
           <a:p>
             <a:fld id="{92835CAA-DB26-41EB-9DA5-3B4C0531874A}" type="datetimeFigureOut">
               <a:rPr lang="es-ES" smtClean="0"/>
-              <a:t>04/08/2019</a:t>
+              <a:t>21/09/2019</a:t>
             </a:fld>
             <a:endParaRPr lang="es-ES"/>
           </a:p>
@@ -1411,7 +1411,7 @@
           <a:p>
             <a:fld id="{92835CAA-DB26-41EB-9DA5-3B4C0531874A}" type="datetimeFigureOut">
               <a:rPr lang="es-ES" smtClean="0"/>
-              <a:t>04/08/2019</a:t>
+              <a:t>21/09/2019</a:t>
             </a:fld>
             <a:endParaRPr lang="es-ES"/>
           </a:p>
@@ -1823,7 +1823,7 @@
           <a:p>
             <a:fld id="{92835CAA-DB26-41EB-9DA5-3B4C0531874A}" type="datetimeFigureOut">
               <a:rPr lang="es-ES" smtClean="0"/>
-              <a:t>04/08/2019</a:t>
+              <a:t>21/09/2019</a:t>
             </a:fld>
             <a:endParaRPr lang="es-ES"/>
           </a:p>
@@ -1964,7 +1964,7 @@
           <a:p>
             <a:fld id="{92835CAA-DB26-41EB-9DA5-3B4C0531874A}" type="datetimeFigureOut">
               <a:rPr lang="es-ES" smtClean="0"/>
-              <a:t>04/08/2019</a:t>
+              <a:t>21/09/2019</a:t>
             </a:fld>
             <a:endParaRPr lang="es-ES"/>
           </a:p>
@@ -2077,7 +2077,7 @@
           <a:p>
             <a:fld id="{92835CAA-DB26-41EB-9DA5-3B4C0531874A}" type="datetimeFigureOut">
               <a:rPr lang="es-ES" smtClean="0"/>
-              <a:t>04/08/2019</a:t>
+              <a:t>21/09/2019</a:t>
             </a:fld>
             <a:endParaRPr lang="es-ES"/>
           </a:p>
@@ -2388,7 +2388,7 @@
           <a:p>
             <a:fld id="{92835CAA-DB26-41EB-9DA5-3B4C0531874A}" type="datetimeFigureOut">
               <a:rPr lang="es-ES" smtClean="0"/>
-              <a:t>04/08/2019</a:t>
+              <a:t>21/09/2019</a:t>
             </a:fld>
             <a:endParaRPr lang="es-ES"/>
           </a:p>
@@ -2676,7 +2676,7 @@
           <a:p>
             <a:fld id="{92835CAA-DB26-41EB-9DA5-3B4C0531874A}" type="datetimeFigureOut">
               <a:rPr lang="es-ES" smtClean="0"/>
-              <a:t>04/08/2019</a:t>
+              <a:t>21/09/2019</a:t>
             </a:fld>
             <a:endParaRPr lang="es-ES"/>
           </a:p>
@@ -2917,7 +2917,7 @@
           <a:p>
             <a:fld id="{92835CAA-DB26-41EB-9DA5-3B4C0531874A}" type="datetimeFigureOut">
               <a:rPr lang="es-ES" smtClean="0"/>
-              <a:t>04/08/2019</a:t>
+              <a:t>21/09/2019</a:t>
             </a:fld>
             <a:endParaRPr lang="es-ES"/>
           </a:p>
@@ -4151,7 +4151,31 @@
           <a:p>
             <a:r>
               <a:rPr lang="es-ES" dirty="0"/>
-              <a:t>También abre posibilidades para la optimización del SEO del sitio.</a:t>
+              <a:t>También abre posibilidades para la optimización del SEO (</a:t>
+            </a:r>
+            <a:r>
+              <a:rPr lang="es-ES" dirty="0" err="1"/>
+              <a:t>search</a:t>
+            </a:r>
+            <a:r>
+              <a:rPr lang="es-ES" dirty="0"/>
+              <a:t> </a:t>
+            </a:r>
+            <a:r>
+              <a:rPr lang="es-ES" dirty="0" err="1"/>
+              <a:t>engine</a:t>
+            </a:r>
+            <a:r>
+              <a:rPr lang="es-ES" dirty="0"/>
+              <a:t> </a:t>
+            </a:r>
+            <a:r>
+              <a:rPr lang="es-ES" dirty="0" err="1"/>
+              <a:t>optimization</a:t>
+            </a:r>
+            <a:r>
+              <a:rPr lang="es-ES" dirty="0"/>
+              <a:t>) del sitio.</a:t>
             </a:r>
           </a:p>
           <a:p>
@@ -4202,7 +4226,7 @@
         </p:blipFill>
         <p:spPr bwMode="auto">
           <a:xfrm>
-            <a:off x="838200" y="4247333"/>
+            <a:off x="1052384" y="4443324"/>
             <a:ext cx="1696843" cy="1325563"/>
           </a:xfrm>
           <a:prstGeom prst="rect">
@@ -4249,7 +4273,7 @@
         </p:blipFill>
         <p:spPr bwMode="auto">
           <a:xfrm>
-            <a:off x="3269478" y="4443324"/>
+            <a:off x="3401283" y="4715172"/>
             <a:ext cx="1728851" cy="933579"/>
           </a:xfrm>
           <a:prstGeom prst="rect">
@@ -4296,7 +4320,7 @@
         </p:blipFill>
         <p:spPr bwMode="auto">
           <a:xfrm>
-            <a:off x="5341080" y="3743300"/>
+            <a:off x="5283415" y="3939292"/>
             <a:ext cx="2333625" cy="2333625"/>
           </a:xfrm>
           <a:prstGeom prst="rect">

</xml_diff>